<commit_message>
refinement: Add EclipseCon 2014 folder
Change-Id: I563c0dd39a79a289a8396703f77075aed321a247
</commit_message>
<xml_diff>
--- a/plugins/org.eclipse.osee.support.admin/presentations_publications/The_Cure_for_Your_Disconnected_Toolset_Headache_live.pptx
+++ b/plugins/org.eclipse.osee.support.admin/presentations_publications/The_Cure_for_Your_Disconnected_Toolset_Headache_live.pptx
@@ -2526,15 +2526,7 @@
           <a:p>
             <a:r>
               <a:rPr lang="en-US" dirty="0" smtClean="0"/>
-              <a:t>Copyright © </a:t>
-            </a:r>
-            <a:r>
-              <a:rPr lang="en-US" dirty="0" smtClean="0"/>
-              <a:t>2013 </a:t>
-            </a:r>
-            <a:r>
-              <a:rPr lang="en-US" dirty="0" smtClean="0"/>
-              <a:t>Boeing. Made available under the Eclipse Public License.</a:t>
+              <a:t>Copyright © 2013 Boeing. Made available under the Eclipse Public License.</a:t>
             </a:r>
             <a:endParaRPr lang="en-US" dirty="0"/>
           </a:p>
@@ -2644,15 +2636,7 @@
           <a:p>
             <a:r>
               <a:rPr lang="en-US" dirty="0" smtClean="0"/>
-              <a:t>Copyright © </a:t>
-            </a:r>
-            <a:r>
-              <a:rPr lang="en-US" dirty="0" smtClean="0"/>
-              <a:t>2013 </a:t>
-            </a:r>
-            <a:r>
-              <a:rPr lang="en-US" dirty="0" smtClean="0"/>
-              <a:t>Boeing. Made available under the Eclipse Public License.</a:t>
+              <a:t>Copyright © 2013 Boeing. Made available under the Eclipse Public License.</a:t>
             </a:r>
             <a:endParaRPr lang="en-US" dirty="0"/>
           </a:p>
@@ -3479,7 +3463,15 @@
             <a:pPr lvl="1"/>
             <a:r>
               <a:rPr lang="en-US" dirty="0" smtClean="0"/>
-              <a:t> ATS provides tracking of code, test, and requirements changes needed to resolve missing coverage</a:t>
+              <a:t> ATS provides tracking of code, test, </a:t>
+            </a:r>
+            <a:r>
+              <a:rPr lang="en-US" smtClean="0"/>
+              <a:t>and requirement </a:t>
+            </a:r>
+            <a:r>
+              <a:rPr lang="en-US" dirty="0" smtClean="0"/>
+              <a:t>changes needed to resolve missing coverage</a:t>
             </a:r>
           </a:p>
           <a:p>
@@ -3685,15 +3677,7 @@
           <a:p>
             <a:r>
               <a:rPr lang="en-US" dirty="0" smtClean="0"/>
-              <a:t>Copyright © </a:t>
-            </a:r>
-            <a:r>
-              <a:rPr lang="en-US" dirty="0" smtClean="0"/>
-              <a:t>2013 </a:t>
-            </a:r>
-            <a:r>
-              <a:rPr lang="en-US" dirty="0" smtClean="0"/>
-              <a:t>Boeing. Made available under the Eclipse Public License.</a:t>
+              <a:t>Copyright © 2013 Boeing. Made available under the Eclipse Public License.</a:t>
             </a:r>
             <a:endParaRPr lang="en-US" dirty="0"/>
           </a:p>
@@ -3838,8 +3822,8 @@
         </p:nvSpPr>
         <p:spPr>
           <a:xfrm>
-            <a:off x="4267200" y="3581400"/>
-            <a:ext cx="4343400" cy="2862322"/>
+            <a:off x="4495800" y="3770055"/>
+            <a:ext cx="4572000" cy="2554545"/>
           </a:xfrm>
           <a:prstGeom prst="rect">
             <a:avLst/>
@@ -3861,22 +3845,56 @@
                   <a:schemeClr val="bg1"/>
                 </a:solidFill>
               </a:rPr>
-              <a:t>  Work Definitions model the team's workflow and actively guide them through the work to be completed.</a:t>
-            </a:r>
-          </a:p>
-          <a:p>
-            <a:pPr>
-              <a:buFont typeface="Wingdings" pitchFamily="2" charset="2"/>
-              <a:buChar char="§"/>
-            </a:pPr>
+              <a:t>  Work Definitions model the team's workflow and actively guide them through the work to be completed</a:t>
+            </a:r>
             <a:r>
               <a:rPr lang="en-US" sz="2000" dirty="0" smtClean="0">
                 <a:solidFill>
                   <a:schemeClr val="bg1"/>
                 </a:solidFill>
               </a:rPr>
-              <a:t>  Work Definitions are created and stored in OSEE and consist of state machines with their own widgets, rules, and routing.</a:t>
-            </a:r>
+              <a:t>.</a:t>
+            </a:r>
+            <a:endParaRPr lang="en-US" sz="2000" dirty="0" smtClean="0">
+              <a:solidFill>
+                <a:schemeClr val="bg1"/>
+              </a:solidFill>
+            </a:endParaRPr>
+          </a:p>
+          <a:p>
+            <a:pPr>
+              <a:buFont typeface="Wingdings" pitchFamily="2" charset="2"/>
+              <a:buChar char="§"/>
+            </a:pPr>
+            <a:r>
+              <a:rPr lang="en-US" sz="2000" dirty="0" smtClean="0">
+                <a:solidFill>
+                  <a:schemeClr val="bg1"/>
+                </a:solidFill>
+              </a:rPr>
+              <a:t> </a:t>
+            </a:r>
+            <a:r>
+              <a:rPr lang="en-US" sz="2000" dirty="0" smtClean="0">
+                <a:solidFill>
+                  <a:schemeClr val="bg1"/>
+                </a:solidFill>
+              </a:rPr>
+              <a:t>Work Definitions are user-defined and consist of state machines with their own widgets, rules, and </a:t>
+            </a:r>
+            <a:r>
+              <a:rPr lang="en-US" sz="2000" dirty="0" smtClean="0">
+                <a:solidFill>
+                  <a:schemeClr val="bg1"/>
+                </a:solidFill>
+              </a:rPr>
+              <a:t>routing.</a:t>
+            </a:r>
+            <a:endParaRPr lang="en-US" sz="2000" dirty="0" smtClean="0">
+              <a:solidFill>
+                <a:schemeClr val="bg1"/>
+              </a:solidFill>
+            </a:endParaRPr>
           </a:p>
           <a:p>
             <a:pPr>
@@ -3992,169 +4010,71 @@
           <a:p>
             <a:r>
               <a:rPr lang="en-US" dirty="0" smtClean="0"/>
-              <a:t>T</a:t>
-            </a:r>
+              <a:t>Task generation with metrics roll-up to Action and project status</a:t>
+            </a:r>
+          </a:p>
+          <a:p>
+            <a:endParaRPr lang="en-US" dirty="0" smtClean="0"/>
+          </a:p>
+          <a:p>
             <a:r>
               <a:rPr lang="en-US" dirty="0" smtClean="0"/>
-              <a:t>ask </a:t>
-            </a:r>
+              <a:t>Product management including build memo generation</a:t>
+            </a:r>
+          </a:p>
+          <a:p>
+            <a:endParaRPr lang="en-US" dirty="0" smtClean="0"/>
+          </a:p>
+          <a:p>
             <a:r>
               <a:rPr lang="en-US" dirty="0" smtClean="0"/>
-              <a:t>generation </a:t>
-            </a:r>
+              <a:t>Customizable columns and reports can be easily shared and printed</a:t>
+            </a:r>
+          </a:p>
+          <a:p>
+            <a:endParaRPr lang="en-US" dirty="0" smtClean="0"/>
+          </a:p>
+          <a:p>
             <a:r>
               <a:rPr lang="en-US" dirty="0" smtClean="0"/>
-              <a:t>with metrics roll-up </a:t>
-            </a:r>
+              <a:t>Customizable reviews that can control workflow state transitions</a:t>
+            </a:r>
+          </a:p>
+          <a:p>
+            <a:endParaRPr lang="en-US" dirty="0" smtClean="0"/>
+          </a:p>
+          <a:p>
             <a:r>
               <a:rPr lang="en-US" dirty="0" smtClean="0"/>
-              <a:t>to Action and project </a:t>
-            </a:r>
+              <a:t>Email notifications of relevant state transitions via subscriptions</a:t>
+            </a:r>
+          </a:p>
+          <a:p>
+            <a:endParaRPr lang="en-US" dirty="0" smtClean="0"/>
+          </a:p>
+          <a:p>
             <a:r>
               <a:rPr lang="en-US" dirty="0" smtClean="0"/>
-              <a:t>status</a:t>
-            </a:r>
+              <a:t>Configurable routing of actions to appropriate assignees</a:t>
+            </a:r>
+          </a:p>
+          <a:p>
             <a:endParaRPr lang="en-US" dirty="0" smtClean="0"/>
           </a:p>
           <a:p>
+            <a:r>
+              <a:rPr lang="en-US" dirty="0" smtClean="0"/>
+              <a:t>"My World" shows user dashboard of all work assigned</a:t>
+            </a:r>
+          </a:p>
+          <a:p>
             <a:endParaRPr lang="en-US" dirty="0" smtClean="0"/>
           </a:p>
           <a:p>
             <a:r>
               <a:rPr lang="en-US" dirty="0" smtClean="0"/>
-              <a:t>P</a:t>
-            </a:r>
-            <a:r>
-              <a:rPr lang="en-US" dirty="0" smtClean="0"/>
-              <a:t>roduct </a:t>
-            </a:r>
-            <a:r>
-              <a:rPr lang="en-US" dirty="0" smtClean="0"/>
-              <a:t>management including build </a:t>
-            </a:r>
-            <a:r>
-              <a:rPr lang="en-US" dirty="0" smtClean="0"/>
-              <a:t>memo generation</a:t>
-            </a:r>
-            <a:endParaRPr lang="en-US" dirty="0" smtClean="0"/>
-          </a:p>
-          <a:p>
-            <a:endParaRPr lang="en-US" dirty="0" smtClean="0"/>
-          </a:p>
-          <a:p>
-            <a:r>
-              <a:rPr lang="en-US" dirty="0" smtClean="0"/>
-              <a:t>Customizable columns and reports </a:t>
-            </a:r>
-            <a:r>
-              <a:rPr lang="en-US" dirty="0" smtClean="0"/>
-              <a:t>can be easily shared and printed</a:t>
-            </a:r>
-          </a:p>
-          <a:p>
-            <a:endParaRPr lang="en-US" dirty="0" smtClean="0"/>
-          </a:p>
-          <a:p>
-            <a:r>
-              <a:rPr lang="en-US" dirty="0" smtClean="0"/>
-              <a:t>Customizable reviews that can control workflow </a:t>
-            </a:r>
-            <a:r>
-              <a:rPr lang="en-US" dirty="0" smtClean="0"/>
-              <a:t>state </a:t>
-            </a:r>
-            <a:r>
-              <a:rPr lang="en-US" dirty="0" smtClean="0"/>
-              <a:t>transitions</a:t>
-            </a:r>
-            <a:endParaRPr lang="en-US" dirty="0" smtClean="0"/>
-          </a:p>
-          <a:p>
-            <a:endParaRPr lang="en-US" dirty="0" smtClean="0"/>
-          </a:p>
-          <a:p>
-            <a:r>
-              <a:rPr lang="en-US" dirty="0" smtClean="0"/>
-              <a:t>Email </a:t>
-            </a:r>
-            <a:r>
-              <a:rPr lang="en-US" dirty="0" smtClean="0"/>
-              <a:t>notifications </a:t>
-            </a:r>
-            <a:r>
-              <a:rPr lang="en-US" dirty="0" smtClean="0"/>
-              <a:t>of relevant state </a:t>
-            </a:r>
-            <a:r>
-              <a:rPr lang="en-US" dirty="0" smtClean="0"/>
-              <a:t>transitions </a:t>
-            </a:r>
-            <a:r>
-              <a:rPr lang="en-US" dirty="0" smtClean="0"/>
-              <a:t>via subscriptions</a:t>
-            </a:r>
-            <a:endParaRPr lang="en-US" dirty="0" smtClean="0"/>
-          </a:p>
-          <a:p>
-            <a:endParaRPr lang="en-US" dirty="0" smtClean="0"/>
-          </a:p>
-          <a:p>
-            <a:r>
-              <a:rPr lang="en-US" dirty="0" smtClean="0"/>
-              <a:t>Configurable routing of actions </a:t>
-            </a:r>
-            <a:r>
-              <a:rPr lang="en-US" dirty="0" smtClean="0"/>
-              <a:t>to appropriate </a:t>
-            </a:r>
-            <a:r>
-              <a:rPr lang="en-US" dirty="0" smtClean="0"/>
-              <a:t>assignees</a:t>
-            </a:r>
-          </a:p>
-          <a:p>
-            <a:endParaRPr lang="en-US" dirty="0" smtClean="0"/>
-          </a:p>
-          <a:p>
-            <a:r>
-              <a:rPr lang="en-US" dirty="0" smtClean="0"/>
-              <a:t>"</a:t>
-            </a:r>
-            <a:r>
-              <a:rPr lang="en-US" dirty="0" smtClean="0"/>
-              <a:t>My World" shows </a:t>
-            </a:r>
-            <a:r>
-              <a:rPr lang="en-US" dirty="0" smtClean="0"/>
-              <a:t>user dashboard of all </a:t>
-            </a:r>
-            <a:r>
-              <a:rPr lang="en-US" dirty="0" smtClean="0"/>
-              <a:t>work </a:t>
-            </a:r>
-            <a:r>
-              <a:rPr lang="en-US" dirty="0" smtClean="0"/>
-              <a:t>assigned</a:t>
-            </a:r>
-            <a:endParaRPr lang="en-US" dirty="0" smtClean="0"/>
-          </a:p>
-          <a:p>
-            <a:endParaRPr lang="en-US" dirty="0" smtClean="0"/>
-          </a:p>
-          <a:p>
-            <a:r>
-              <a:rPr lang="en-US" dirty="0" smtClean="0"/>
-              <a:t>Powerful </a:t>
-            </a:r>
-            <a:r>
-              <a:rPr lang="en-US" dirty="0" smtClean="0"/>
-              <a:t>Action querying, filtering and </a:t>
-            </a:r>
-            <a:r>
-              <a:rPr lang="en-US" dirty="0" smtClean="0"/>
-              <a:t>sorting</a:t>
-            </a:r>
-            <a:endParaRPr lang="en-US" dirty="0" smtClean="0"/>
+              <a:t>Powerful Action querying, filtering and sorting</a:t>
+            </a:r>
           </a:p>
         </p:txBody>
       </p:sp>
@@ -4175,15 +4095,7 @@
           <a:p>
             <a:r>
               <a:rPr lang="en-US" dirty="0" smtClean="0"/>
-              <a:t>Copyright © </a:t>
-            </a:r>
-            <a:r>
-              <a:rPr lang="en-US" dirty="0" smtClean="0"/>
-              <a:t>2013 </a:t>
-            </a:r>
-            <a:r>
-              <a:rPr lang="en-US" dirty="0" smtClean="0"/>
-              <a:t>Boeing. Made available under the Eclipse Public License.</a:t>
+              <a:t>Copyright © 2013 Boeing. Made available under the Eclipse Public License.</a:t>
             </a:r>
             <a:endParaRPr lang="en-US" dirty="0"/>
           </a:p>
@@ -4341,15 +4253,7 @@
           <a:p>
             <a:r>
               <a:rPr lang="en-US" dirty="0" smtClean="0"/>
-              <a:t>Copyright © </a:t>
-            </a:r>
-            <a:r>
-              <a:rPr lang="en-US" dirty="0" smtClean="0"/>
-              <a:t>2013 </a:t>
-            </a:r>
-            <a:r>
-              <a:rPr lang="en-US" dirty="0" smtClean="0"/>
-              <a:t>Boeing. Made available under the Eclipse Public License.</a:t>
+              <a:t>Copyright © 2013 Boeing. Made available under the Eclipse Public License.</a:t>
             </a:r>
             <a:endParaRPr lang="en-US" dirty="0"/>
           </a:p>
@@ -4616,15 +4520,7 @@
           <a:p>
             <a:r>
               <a:rPr lang="en-US" dirty="0" smtClean="0"/>
-              <a:t>Copyright © </a:t>
-            </a:r>
-            <a:r>
-              <a:rPr lang="en-US" dirty="0" smtClean="0"/>
-              <a:t>2013 </a:t>
-            </a:r>
-            <a:r>
-              <a:rPr lang="en-US" dirty="0" smtClean="0"/>
-              <a:t>Boeing. Made available under the Eclipse Public License.</a:t>
+              <a:t>Copyright © 2013 Boeing. Made available under the Eclipse Public License.</a:t>
             </a:r>
             <a:endParaRPr lang="en-US" dirty="0"/>
           </a:p>
@@ -5557,15 +5453,7 @@
           <a:p>
             <a:r>
               <a:rPr lang="en-US" dirty="0" smtClean="0"/>
-              <a:t>Copyright © </a:t>
-            </a:r>
-            <a:r>
-              <a:rPr lang="en-US" dirty="0" smtClean="0"/>
-              <a:t>2013 </a:t>
-            </a:r>
-            <a:r>
-              <a:rPr lang="en-US" dirty="0" smtClean="0"/>
-              <a:t>Boeing. Made available under the Eclipse Public License.</a:t>
+              <a:t>Copyright © 2013 Boeing. Made available under the Eclipse Public License.</a:t>
             </a:r>
             <a:endParaRPr lang="en-US" dirty="0"/>
           </a:p>
@@ -5914,15 +5802,7 @@
           <a:p>
             <a:r>
               <a:rPr lang="en-US" dirty="0" smtClean="0"/>
-              <a:t>Copyright © </a:t>
-            </a:r>
-            <a:r>
-              <a:rPr lang="en-US" dirty="0" smtClean="0"/>
-              <a:t>2013 </a:t>
-            </a:r>
-            <a:r>
-              <a:rPr lang="en-US" dirty="0" smtClean="0"/>
-              <a:t>Boeing. Made available under the Eclipse Public License.</a:t>
+              <a:t>Copyright © 2013 Boeing. Made available under the Eclipse Public License.</a:t>
             </a:r>
             <a:endParaRPr lang="en-US" dirty="0"/>
           </a:p>
@@ -6194,15 +6074,7 @@
           <a:p>
             <a:r>
               <a:rPr lang="en-US" dirty="0" smtClean="0"/>
-              <a:t>Copyright © </a:t>
-            </a:r>
-            <a:r>
-              <a:rPr lang="en-US" dirty="0" smtClean="0"/>
-              <a:t>2013 </a:t>
-            </a:r>
-            <a:r>
-              <a:rPr lang="en-US" dirty="0" smtClean="0"/>
-              <a:t>Boeing. Made available under the Eclipse Public License.</a:t>
+              <a:t>Copyright © 2013 Boeing. Made available under the Eclipse Public License.</a:t>
             </a:r>
             <a:endParaRPr lang="en-US" dirty="0"/>
           </a:p>
@@ -6398,15 +6270,7 @@
           <a:p>
             <a:r>
               <a:rPr lang="en-US" dirty="0" smtClean="0"/>
-              <a:t>Copyright © </a:t>
-            </a:r>
-            <a:r>
-              <a:rPr lang="en-US" dirty="0" smtClean="0"/>
-              <a:t>2013 </a:t>
-            </a:r>
-            <a:r>
-              <a:rPr lang="en-US" dirty="0" smtClean="0"/>
-              <a:t>Boeing. Made available under the Eclipse Public License.</a:t>
+              <a:t>Copyright © 2013 Boeing. Made available under the Eclipse Public License.</a:t>
             </a:r>
             <a:endParaRPr lang="en-US" dirty="0"/>
           </a:p>
@@ -9651,15 +9515,7 @@
           <a:p>
             <a:r>
               <a:rPr lang="en-US" dirty="0" smtClean="0"/>
-              <a:t>Copyright © </a:t>
-            </a:r>
-            <a:r>
-              <a:rPr lang="en-US" dirty="0" smtClean="0"/>
-              <a:t>2013 </a:t>
-            </a:r>
-            <a:r>
-              <a:rPr lang="en-US" dirty="0" smtClean="0"/>
-              <a:t>Boeing. Made available under the Eclipse Public License.</a:t>
+              <a:t>Copyright © 2013 Boeing. Made available under the Eclipse Public License.</a:t>
             </a:r>
             <a:endParaRPr lang="en-US" dirty="0"/>
           </a:p>

</xml_diff>

<commit_message>
refinement: Update architecture diagram in overview presentation
Change-Id: I618c0080fe63b3e129dea5784c09a52ab5c9849c
</commit_message>
<xml_diff>
--- a/plugins/org.eclipse.osee.support.admin/presentations_publications/The_Cure_for_Your_Disconnected_Toolset_Headache_live.pptx
+++ b/plugins/org.eclipse.osee.support.admin/presentations_publications/The_Cure_for_Your_Disconnected_Toolset_Headache_live.pptx
@@ -156,6 +156,22 @@
       </a:defRPr>
     </a:lvl9pPr>
   </p:defaultTextStyle>
+  <p:extLst>
+    <p:ext uri="{EFAFB233-063F-42B5-8137-9DF3F51BA10A}">
+      <p15:sldGuideLst xmlns:p15="http://schemas.microsoft.com/office/powerpoint/2012/main">
+        <p15:guide id="1" orient="horz" pos="2160">
+          <p15:clr>
+            <a:srgbClr val="A4A3A4"/>
+          </p15:clr>
+        </p15:guide>
+        <p15:guide id="2" pos="2880">
+          <p15:clr>
+            <a:srgbClr val="A4A3A4"/>
+          </p15:clr>
+        </p15:guide>
+      </p15:sldGuideLst>
+    </p:ext>
+  </p:extLst>
 </p:presentation>
 </file>
 
@@ -463,6 +479,11 @@
         </p:txBody>
       </p:sp>
     </p:spTree>
+    <p:extLst>
+      <p:ext uri="{BB962C8B-B14F-4D97-AF65-F5344CB8AC3E}">
+        <p14:creationId xmlns:p14="http://schemas.microsoft.com/office/powerpoint/2010/main" val="3626036874"/>
+      </p:ext>
+    </p:extLst>
   </p:cSld>
   <p:clrMap bg1="lt1" tx1="dk1" bg2="lt2" tx2="dk2" accent1="accent1" accent2="accent2" accent3="accent3" accent4="accent4" accent5="accent5" accent6="accent6" hlink="hlink" folHlink="folHlink"/>
   <p:notesStyle>
@@ -667,6 +688,11 @@
         </p:txBody>
       </p:sp>
     </p:spTree>
+    <p:extLst>
+      <p:ext uri="{BB962C8B-B14F-4D97-AF65-F5344CB8AC3E}">
+        <p14:creationId xmlns:p14="http://schemas.microsoft.com/office/powerpoint/2010/main" val="3184291884"/>
+      </p:ext>
+    </p:extLst>
   </p:cSld>
   <p:clrMapOvr>
     <a:masterClrMapping/>
@@ -839,6 +865,11 @@
         </p:txBody>
       </p:sp>
     </p:spTree>
+    <p:extLst>
+      <p:ext uri="{BB962C8B-B14F-4D97-AF65-F5344CB8AC3E}">
+        <p14:creationId xmlns:p14="http://schemas.microsoft.com/office/powerpoint/2010/main" val="4267873385"/>
+      </p:ext>
+    </p:extLst>
   </p:cSld>
   <p:clrMapOvr>
     <a:masterClrMapping/>
@@ -946,6 +977,11 @@
         </p:txBody>
       </p:sp>
     </p:spTree>
+    <p:extLst>
+      <p:ext uri="{BB962C8B-B14F-4D97-AF65-F5344CB8AC3E}">
+        <p14:creationId xmlns:p14="http://schemas.microsoft.com/office/powerpoint/2010/main" val="2413781149"/>
+      </p:ext>
+    </p:extLst>
   </p:cSld>
   <p:clrMapOvr>
     <a:masterClrMapping/>
@@ -1057,6 +1093,11 @@
         </p:txBody>
       </p:sp>
     </p:spTree>
+    <p:extLst>
+      <p:ext uri="{BB962C8B-B14F-4D97-AF65-F5344CB8AC3E}">
+        <p14:creationId xmlns:p14="http://schemas.microsoft.com/office/powerpoint/2010/main" val="474613102"/>
+      </p:ext>
+    </p:extLst>
   </p:cSld>
   <p:clrMapOvr>
     <a:masterClrMapping/>
@@ -1139,6 +1180,11 @@
         </p:txBody>
       </p:sp>
     </p:spTree>
+    <p:extLst>
+      <p:ext uri="{BB962C8B-B14F-4D97-AF65-F5344CB8AC3E}">
+        <p14:creationId xmlns:p14="http://schemas.microsoft.com/office/powerpoint/2010/main" val="1051791461"/>
+      </p:ext>
+    </p:extLst>
   </p:cSld>
   <p:clrMapOvr>
     <a:masterClrMapping/>
@@ -1223,6 +1269,11 @@
         </p:txBody>
       </p:sp>
     </p:spTree>
+    <p:extLst>
+      <p:ext uri="{BB962C8B-B14F-4D97-AF65-F5344CB8AC3E}">
+        <p14:creationId xmlns:p14="http://schemas.microsoft.com/office/powerpoint/2010/main" val="396293251"/>
+      </p:ext>
+    </p:extLst>
   </p:cSld>
   <p:clrMapOvr>
     <a:masterClrMapping/>
@@ -3845,56 +3896,22 @@
                   <a:schemeClr val="bg1"/>
                 </a:solidFill>
               </a:rPr>
-              <a:t>  Work Definitions model the team's workflow and actively guide them through the work to be completed</a:t>
-            </a:r>
+              <a:t>  Work Definitions model the team's workflow and actively guide them through the work to be completed.</a:t>
+            </a:r>
+          </a:p>
+          <a:p>
+            <a:pPr>
+              <a:buFont typeface="Wingdings" pitchFamily="2" charset="2"/>
+              <a:buChar char="§"/>
+            </a:pPr>
             <a:r>
               <a:rPr lang="en-US" sz="2000" dirty="0" smtClean="0">
                 <a:solidFill>
                   <a:schemeClr val="bg1"/>
                 </a:solidFill>
               </a:rPr>
-              <a:t>.</a:t>
-            </a:r>
-            <a:endParaRPr lang="en-US" sz="2000" dirty="0" smtClean="0">
-              <a:solidFill>
-                <a:schemeClr val="bg1"/>
-              </a:solidFill>
-            </a:endParaRPr>
-          </a:p>
-          <a:p>
-            <a:pPr>
-              <a:buFont typeface="Wingdings" pitchFamily="2" charset="2"/>
-              <a:buChar char="§"/>
-            </a:pPr>
-            <a:r>
-              <a:rPr lang="en-US" sz="2000" dirty="0" smtClean="0">
-                <a:solidFill>
-                  <a:schemeClr val="bg1"/>
-                </a:solidFill>
-              </a:rPr>
-              <a:t> </a:t>
-            </a:r>
-            <a:r>
-              <a:rPr lang="en-US" sz="2000" dirty="0" smtClean="0">
-                <a:solidFill>
-                  <a:schemeClr val="bg1"/>
-                </a:solidFill>
-              </a:rPr>
-              <a:t>Work Definitions are user-defined and consist of state machines with their own widgets, rules, and </a:t>
-            </a:r>
-            <a:r>
-              <a:rPr lang="en-US" sz="2000" dirty="0" smtClean="0">
-                <a:solidFill>
-                  <a:schemeClr val="bg1"/>
-                </a:solidFill>
-              </a:rPr>
-              <a:t>routing.</a:t>
-            </a:r>
-            <a:endParaRPr lang="en-US" sz="2000" dirty="0" smtClean="0">
-              <a:solidFill>
-                <a:schemeClr val="bg1"/>
-              </a:solidFill>
-            </a:endParaRPr>
+              <a:t> Work Definitions are user-defined and consist of state machines with their own widgets, rules, and routing.</a:t>
+            </a:r>
           </a:p>
           <a:p>
             <a:pPr>
@@ -10406,118 +10423,6 @@
           </a:fontRef>
         </p:style>
       </p:cxnSp>
-      <p:sp>
-        <p:nvSpPr>
-          <p:cNvPr id="52" name="Text Box 43"/>
-          <p:cNvSpPr txBox="1">
-            <a:spLocks noChangeArrowheads="1"/>
-          </p:cNvSpPr>
-          <p:nvPr/>
-        </p:nvSpPr>
-        <p:spPr bwMode="auto">
-          <a:xfrm>
-            <a:off x="1676400" y="1356896"/>
-            <a:ext cx="762000" cy="338554"/>
-          </a:xfrm>
-          <a:prstGeom prst="rect">
-            <a:avLst/>
-          </a:prstGeom>
-          <a:noFill/>
-          <a:ln w="9525">
-            <a:noFill/>
-            <a:miter lim="800000"/>
-            <a:headEnd/>
-            <a:tailEnd/>
-          </a:ln>
-          <a:effectLst/>
-        </p:spPr>
-        <p:txBody>
-          <a:bodyPr wrap="square">
-            <a:spAutoFit/>
-          </a:bodyPr>
-          <a:lstStyle/>
-          <a:p>
-            <a:pPr>
-              <a:spcBef>
-                <a:spcPct val="50000"/>
-              </a:spcBef>
-            </a:pPr>
-            <a:r>
-              <a:rPr lang="en-US" sz="1600" dirty="0" smtClean="0">
-                <a:solidFill>
-                  <a:schemeClr val="bg1"/>
-                </a:solidFill>
-                <a:latin typeface="Arial" pitchFamily="34" charset="0"/>
-                <a:cs typeface="Arial" pitchFamily="34" charset="0"/>
-              </a:rPr>
-              <a:t>HTTP</a:t>
-            </a:r>
-            <a:endParaRPr lang="en-US" sz="1600" dirty="0">
-              <a:solidFill>
-                <a:schemeClr val="bg1"/>
-              </a:solidFill>
-              <a:latin typeface="Arial" pitchFamily="34" charset="0"/>
-              <a:cs typeface="Arial" pitchFamily="34" charset="0"/>
-            </a:endParaRPr>
-          </a:p>
-        </p:txBody>
-      </p:sp>
-      <p:sp>
-        <p:nvSpPr>
-          <p:cNvPr id="57" name="Text Box 43"/>
-          <p:cNvSpPr txBox="1">
-            <a:spLocks noChangeArrowheads="1"/>
-          </p:cNvSpPr>
-          <p:nvPr/>
-        </p:nvSpPr>
-        <p:spPr bwMode="auto">
-          <a:xfrm>
-            <a:off x="1524000" y="2514600"/>
-            <a:ext cx="762000" cy="338554"/>
-          </a:xfrm>
-          <a:prstGeom prst="rect">
-            <a:avLst/>
-          </a:prstGeom>
-          <a:noFill/>
-          <a:ln w="9525">
-            <a:noFill/>
-            <a:miter lim="800000"/>
-            <a:headEnd/>
-            <a:tailEnd/>
-          </a:ln>
-          <a:effectLst/>
-        </p:spPr>
-        <p:txBody>
-          <a:bodyPr wrap="square">
-            <a:spAutoFit/>
-          </a:bodyPr>
-          <a:lstStyle/>
-          <a:p>
-            <a:pPr>
-              <a:spcBef>
-                <a:spcPct val="50000"/>
-              </a:spcBef>
-            </a:pPr>
-            <a:r>
-              <a:rPr lang="en-US" sz="1600" dirty="0" smtClean="0">
-                <a:solidFill>
-                  <a:schemeClr val="bg1"/>
-                </a:solidFill>
-                <a:latin typeface="Arial" pitchFamily="34" charset="0"/>
-                <a:cs typeface="Arial" pitchFamily="34" charset="0"/>
-              </a:rPr>
-              <a:t>HTTP</a:t>
-            </a:r>
-            <a:endParaRPr lang="en-US" sz="1600" dirty="0">
-              <a:solidFill>
-                <a:schemeClr val="bg1"/>
-              </a:solidFill>
-              <a:latin typeface="Arial" pitchFamily="34" charset="0"/>
-              <a:cs typeface="Arial" pitchFamily="34" charset="0"/>
-            </a:endParaRPr>
-          </a:p>
-        </p:txBody>
-      </p:sp>
       <p:cxnSp>
         <p:nvCxnSpPr>
           <p:cNvPr id="58" name="Straight Arrow Connector 57"/>
@@ -10555,99 +10460,6 @@
           </a:fontRef>
         </p:style>
       </p:cxnSp>
-      <p:cxnSp>
-        <p:nvCxnSpPr>
-          <p:cNvPr id="60" name="Straight Arrow Connector 59"/>
-          <p:cNvCxnSpPr/>
-          <p:nvPr/>
-        </p:nvCxnSpPr>
-        <p:spPr>
-          <a:xfrm flipV="1">
-            <a:off x="1676400" y="1752600"/>
-            <a:ext cx="4114800" cy="1676400"/>
-          </a:xfrm>
-          <a:prstGeom prst="straightConnector1">
-            <a:avLst/>
-          </a:prstGeom>
-          <a:ln w="25400">
-            <a:solidFill>
-              <a:schemeClr val="bg1"/>
-            </a:solidFill>
-            <a:headEnd type="triangle"/>
-            <a:tailEnd type="triangle"/>
-          </a:ln>
-        </p:spPr>
-        <p:style>
-          <a:lnRef idx="1">
-            <a:schemeClr val="accent1"/>
-          </a:lnRef>
-          <a:fillRef idx="0">
-            <a:schemeClr val="accent1"/>
-          </a:fillRef>
-          <a:effectRef idx="0">
-            <a:schemeClr val="accent1"/>
-          </a:effectRef>
-          <a:fontRef idx="minor">
-            <a:schemeClr val="tx1"/>
-          </a:fontRef>
-        </p:style>
-      </p:cxnSp>
-      <p:sp>
-        <p:nvSpPr>
-          <p:cNvPr id="62" name="Text Box 43"/>
-          <p:cNvSpPr txBox="1">
-            <a:spLocks noChangeArrowheads="1"/>
-          </p:cNvSpPr>
-          <p:nvPr/>
-        </p:nvSpPr>
-        <p:spPr bwMode="auto">
-          <a:xfrm>
-            <a:off x="4038600" y="2438400"/>
-            <a:ext cx="762000" cy="338554"/>
-          </a:xfrm>
-          <a:prstGeom prst="rect">
-            <a:avLst/>
-          </a:prstGeom>
-          <a:noFill/>
-          <a:ln w="9525">
-            <a:noFill/>
-            <a:miter lim="800000"/>
-            <a:headEnd/>
-            <a:tailEnd/>
-          </a:ln>
-          <a:effectLst/>
-        </p:spPr>
-        <p:txBody>
-          <a:bodyPr wrap="square">
-            <a:spAutoFit/>
-          </a:bodyPr>
-          <a:lstStyle/>
-          <a:p>
-            <a:pPr>
-              <a:spcBef>
-                <a:spcPct val="50000"/>
-              </a:spcBef>
-            </a:pPr>
-            <a:r>
-              <a:rPr lang="en-US" sz="1600" dirty="0" smtClean="0">
-                <a:solidFill>
-                  <a:schemeClr val="bg1"/>
-                </a:solidFill>
-                <a:latin typeface="Arial" pitchFamily="34" charset="0"/>
-                <a:cs typeface="Arial" pitchFamily="34" charset="0"/>
-              </a:rPr>
-              <a:t>HTTP</a:t>
-            </a:r>
-            <a:endParaRPr lang="en-US" sz="1600" dirty="0">
-              <a:solidFill>
-                <a:schemeClr val="bg1"/>
-              </a:solidFill>
-              <a:latin typeface="Arial" pitchFamily="34" charset="0"/>
-              <a:cs typeface="Arial" pitchFamily="34" charset="0"/>
-            </a:endParaRPr>
-          </a:p>
-        </p:txBody>
-      </p:sp>
       <p:cxnSp>
         <p:nvCxnSpPr>
           <p:cNvPr id="63" name="Straight Arrow Connector 62"/>
@@ -10949,101 +10761,6 @@
       </p:cxnSp>
       <p:cxnSp>
         <p:nvCxnSpPr>
-          <p:cNvPr id="92" name="Curved Connector 91"/>
-          <p:cNvCxnSpPr/>
-          <p:nvPr/>
-        </p:nvCxnSpPr>
-        <p:spPr>
-          <a:xfrm>
-            <a:off x="1600200" y="1066800"/>
-            <a:ext cx="4191000" cy="533400"/>
-          </a:xfrm>
-          <a:prstGeom prst="curvedConnector3">
-            <a:avLst>
-              <a:gd name="adj1" fmla="val 92500"/>
-            </a:avLst>
-          </a:prstGeom>
-          <a:ln w="25400">
-            <a:solidFill>
-              <a:schemeClr val="bg1"/>
-            </a:solidFill>
-            <a:headEnd type="triangle"/>
-            <a:tailEnd type="triangle"/>
-          </a:ln>
-        </p:spPr>
-        <p:style>
-          <a:lnRef idx="1">
-            <a:schemeClr val="accent1"/>
-          </a:lnRef>
-          <a:fillRef idx="0">
-            <a:schemeClr val="accent1"/>
-          </a:fillRef>
-          <a:effectRef idx="0">
-            <a:schemeClr val="accent1"/>
-          </a:effectRef>
-          <a:fontRef idx="minor">
-            <a:schemeClr val="tx1"/>
-          </a:fontRef>
-        </p:style>
-      </p:cxnSp>
-      <p:sp>
-        <p:nvSpPr>
-          <p:cNvPr id="101" name="Text Box 43"/>
-          <p:cNvSpPr txBox="1">
-            <a:spLocks noChangeArrowheads="1"/>
-          </p:cNvSpPr>
-          <p:nvPr/>
-        </p:nvSpPr>
-        <p:spPr bwMode="auto">
-          <a:xfrm>
-            <a:off x="1905000" y="762000"/>
-            <a:ext cx="762000" cy="338554"/>
-          </a:xfrm>
-          <a:prstGeom prst="rect">
-            <a:avLst/>
-          </a:prstGeom>
-          <a:noFill/>
-          <a:ln w="9525">
-            <a:noFill/>
-            <a:miter lim="800000"/>
-            <a:headEnd/>
-            <a:tailEnd/>
-          </a:ln>
-          <a:effectLst/>
-        </p:spPr>
-        <p:txBody>
-          <a:bodyPr wrap="square">
-            <a:spAutoFit/>
-          </a:bodyPr>
-          <a:lstStyle/>
-          <a:p>
-            <a:pPr>
-              <a:spcBef>
-                <a:spcPct val="50000"/>
-              </a:spcBef>
-            </a:pPr>
-            <a:r>
-              <a:rPr lang="en-US" sz="1600" dirty="0" smtClean="0">
-                <a:solidFill>
-                  <a:schemeClr val="bg1"/>
-                </a:solidFill>
-                <a:latin typeface="Arial" pitchFamily="34" charset="0"/>
-                <a:cs typeface="Arial" pitchFamily="34" charset="0"/>
-              </a:rPr>
-              <a:t>HTTP</a:t>
-            </a:r>
-            <a:endParaRPr lang="en-US" sz="1600" dirty="0">
-              <a:solidFill>
-                <a:schemeClr val="bg1"/>
-              </a:solidFill>
-              <a:latin typeface="Arial" pitchFamily="34" charset="0"/>
-              <a:cs typeface="Arial" pitchFamily="34" charset="0"/>
-            </a:endParaRPr>
-          </a:p>
-        </p:txBody>
-      </p:sp>
-      <p:cxnSp>
-        <p:nvCxnSpPr>
           <p:cNvPr id="102" name="Straight Arrow Connector 101"/>
           <p:cNvCxnSpPr/>
           <p:nvPr/>
@@ -11361,8 +11078,33 @@
                 <a:latin typeface="Arial" pitchFamily="34" charset="0"/>
                 <a:cs typeface="Arial" pitchFamily="34" charset="0"/>
               </a:rPr>
-              <a:t>Web UI (Vaadin)</a:t>
-            </a:r>
+              <a:t>Web UI </a:t>
+            </a:r>
+            <a:r>
+              <a:rPr lang="en-US" sz="1600" dirty="0" smtClean="0">
+                <a:latin typeface="Arial" pitchFamily="34" charset="0"/>
+                <a:cs typeface="Arial" pitchFamily="34" charset="0"/>
+              </a:rPr>
+              <a:t>(</a:t>
+            </a:r>
+            <a:r>
+              <a:rPr lang="en-US" sz="1600" dirty="0" smtClean="0">
+                <a:latin typeface="Arial" pitchFamily="34" charset="0"/>
+                <a:cs typeface="Arial" pitchFamily="34" charset="0"/>
+              </a:rPr>
+              <a:t>Angular</a:t>
+            </a:r>
+            <a:r>
+              <a:rPr lang="en-US" sz="1600" dirty="0" smtClean="0">
+                <a:latin typeface="Arial" pitchFamily="34" charset="0"/>
+                <a:cs typeface="Arial" pitchFamily="34" charset="0"/>
+              </a:rPr>
+              <a:t>)</a:t>
+            </a:r>
+            <a:endParaRPr lang="en-US" sz="1600" dirty="0" smtClean="0">
+              <a:latin typeface="Arial" pitchFamily="34" charset="0"/>
+              <a:cs typeface="Arial" pitchFamily="34" charset="0"/>
+            </a:endParaRPr>
           </a:p>
         </p:txBody>
       </p:sp>
@@ -11678,6 +11420,211 @@
           </a:p>
         </p:txBody>
       </p:sp>
+      <p:sp>
+        <p:nvSpPr>
+          <p:cNvPr id="54" name="Text Box 43"/>
+          <p:cNvSpPr txBox="1">
+            <a:spLocks noChangeArrowheads="1"/>
+          </p:cNvSpPr>
+          <p:nvPr/>
+        </p:nvSpPr>
+        <p:spPr bwMode="auto">
+          <a:xfrm>
+            <a:off x="1295400" y="2597113"/>
+            <a:ext cx="914400" cy="338554"/>
+          </a:xfrm>
+          <a:prstGeom prst="rect">
+            <a:avLst/>
+          </a:prstGeom>
+          <a:noFill/>
+          <a:ln w="9525">
+            <a:noFill/>
+            <a:miter lim="800000"/>
+            <a:headEnd/>
+            <a:tailEnd/>
+          </a:ln>
+          <a:effectLst/>
+        </p:spPr>
+        <p:txBody>
+          <a:bodyPr wrap="square">
+            <a:spAutoFit/>
+          </a:bodyPr>
+          <a:lstStyle/>
+          <a:p>
+            <a:pPr>
+              <a:spcBef>
+                <a:spcPct val="50000"/>
+              </a:spcBef>
+            </a:pPr>
+            <a:r>
+              <a:rPr lang="en-US" sz="1600" dirty="0" smtClean="0">
+                <a:solidFill>
+                  <a:schemeClr val="bg1"/>
+                </a:solidFill>
+                <a:latin typeface="Arial" pitchFamily="34" charset="0"/>
+                <a:cs typeface="Arial" pitchFamily="34" charset="0"/>
+              </a:rPr>
+              <a:t>HTTPS</a:t>
+            </a:r>
+            <a:endParaRPr lang="en-US" sz="1600" dirty="0">
+              <a:solidFill>
+                <a:schemeClr val="bg1"/>
+              </a:solidFill>
+              <a:latin typeface="Arial" pitchFamily="34" charset="0"/>
+              <a:cs typeface="Arial" pitchFamily="34" charset="0"/>
+            </a:endParaRPr>
+          </a:p>
+        </p:txBody>
+      </p:sp>
+      <p:sp>
+        <p:nvSpPr>
+          <p:cNvPr id="55" name="Text Box 43"/>
+          <p:cNvSpPr txBox="1">
+            <a:spLocks noChangeArrowheads="1"/>
+          </p:cNvSpPr>
+          <p:nvPr/>
+        </p:nvSpPr>
+        <p:spPr bwMode="auto">
+          <a:xfrm>
+            <a:off x="4980432" y="1754568"/>
+            <a:ext cx="914400" cy="338554"/>
+          </a:xfrm>
+          <a:prstGeom prst="rect">
+            <a:avLst/>
+          </a:prstGeom>
+          <a:noFill/>
+          <a:ln w="9525">
+            <a:noFill/>
+            <a:miter lim="800000"/>
+            <a:headEnd/>
+            <a:tailEnd/>
+          </a:ln>
+          <a:effectLst/>
+        </p:spPr>
+        <p:txBody>
+          <a:bodyPr wrap="square">
+            <a:spAutoFit/>
+          </a:bodyPr>
+          <a:lstStyle/>
+          <a:p>
+            <a:pPr>
+              <a:spcBef>
+                <a:spcPct val="50000"/>
+              </a:spcBef>
+            </a:pPr>
+            <a:r>
+              <a:rPr lang="en-US" sz="1600" dirty="0" smtClean="0">
+                <a:solidFill>
+                  <a:schemeClr val="bg1"/>
+                </a:solidFill>
+                <a:latin typeface="Arial" pitchFamily="34" charset="0"/>
+                <a:cs typeface="Arial" pitchFamily="34" charset="0"/>
+              </a:rPr>
+              <a:t>HTTPS</a:t>
+            </a:r>
+            <a:endParaRPr lang="en-US" sz="1600" dirty="0">
+              <a:solidFill>
+                <a:schemeClr val="bg1"/>
+              </a:solidFill>
+              <a:latin typeface="Arial" pitchFamily="34" charset="0"/>
+              <a:cs typeface="Arial" pitchFamily="34" charset="0"/>
+            </a:endParaRPr>
+          </a:p>
+        </p:txBody>
+      </p:sp>
+      <p:sp>
+        <p:nvSpPr>
+          <p:cNvPr id="56" name="Text Box 43"/>
+          <p:cNvSpPr txBox="1">
+            <a:spLocks noChangeArrowheads="1"/>
+          </p:cNvSpPr>
+          <p:nvPr/>
+        </p:nvSpPr>
+        <p:spPr bwMode="auto">
+          <a:xfrm>
+            <a:off x="1561338" y="1801360"/>
+            <a:ext cx="914400" cy="338554"/>
+          </a:xfrm>
+          <a:prstGeom prst="rect">
+            <a:avLst/>
+          </a:prstGeom>
+          <a:noFill/>
+          <a:ln w="9525">
+            <a:noFill/>
+            <a:miter lim="800000"/>
+            <a:headEnd/>
+            <a:tailEnd/>
+          </a:ln>
+          <a:effectLst/>
+        </p:spPr>
+        <p:txBody>
+          <a:bodyPr wrap="square">
+            <a:spAutoFit/>
+          </a:bodyPr>
+          <a:lstStyle/>
+          <a:p>
+            <a:pPr>
+              <a:spcBef>
+                <a:spcPct val="50000"/>
+              </a:spcBef>
+            </a:pPr>
+            <a:r>
+              <a:rPr lang="en-US" sz="1600" dirty="0" smtClean="0">
+                <a:solidFill>
+                  <a:schemeClr val="bg1"/>
+                </a:solidFill>
+                <a:latin typeface="Arial" pitchFamily="34" charset="0"/>
+                <a:cs typeface="Arial" pitchFamily="34" charset="0"/>
+              </a:rPr>
+              <a:t>HTTPS</a:t>
+            </a:r>
+            <a:endParaRPr lang="en-US" sz="1600" dirty="0">
+              <a:solidFill>
+                <a:schemeClr val="bg1"/>
+              </a:solidFill>
+              <a:latin typeface="Arial" pitchFamily="34" charset="0"/>
+              <a:cs typeface="Arial" pitchFamily="34" charset="0"/>
+            </a:endParaRPr>
+          </a:p>
+        </p:txBody>
+      </p:sp>
+      <p:cxnSp>
+        <p:nvCxnSpPr>
+          <p:cNvPr id="59" name="Straight Arrow Connector 58"/>
+          <p:cNvCxnSpPr/>
+          <p:nvPr/>
+        </p:nvCxnSpPr>
+        <p:spPr>
+          <a:xfrm>
+            <a:off x="5029200" y="1732788"/>
+            <a:ext cx="762000" cy="0"/>
+          </a:xfrm>
+          <a:prstGeom prst="straightConnector1">
+            <a:avLst/>
+          </a:prstGeom>
+          <a:ln w="25400">
+            <a:solidFill>
+              <a:schemeClr val="bg1"/>
+            </a:solidFill>
+            <a:headEnd type="triangle"/>
+            <a:tailEnd type="triangle"/>
+          </a:ln>
+        </p:spPr>
+        <p:style>
+          <a:lnRef idx="1">
+            <a:schemeClr val="accent1"/>
+          </a:lnRef>
+          <a:fillRef idx="0">
+            <a:schemeClr val="accent1"/>
+          </a:fillRef>
+          <a:effectRef idx="0">
+            <a:schemeClr val="accent1"/>
+          </a:effectRef>
+          <a:fontRef idx="minor">
+            <a:schemeClr val="tx1"/>
+          </a:fontRef>
+        </p:style>
+      </p:cxnSp>
     </p:spTree>
   </p:cSld>
   <p:clrMapOvr>

</xml_diff>